<commit_message>
Kendra added updates for group meeting 11/20/17
</commit_message>
<xml_diff>
--- a/KendraAndersen/Meeting_Presentations/Presentation 17-11-06.pptx
+++ b/KendraAndersen/Meeting_Presentations/Presentation 17-11-06.pptx
@@ -211,7 +211,7 @@
           <a:effectLst/>
           <a:extLst>
             <a:ext uri="{91240B29-F687-4f45-9708-019B960494DF}">
-              <a14:hiddenLine xmlns:a14="http://schemas.microsoft.com/office/drawing/2010/main" xmlns="" w="9525">
+              <a14:hiddenLine xmlns="" xmlns:a14="http://schemas.microsoft.com/office/drawing/2010/main" w="9525">
                 <a:solidFill>
                   <a:srgbClr val="000000"/>
                 </a:solidFill>
@@ -1721,7 +1721,7 @@
           <a:ln/>
           <a:extLst>
             <a:ext uri="{91240B29-F687-4f45-9708-019B960494DF}">
-              <a14:hiddenLine xmlns:a14="http://schemas.microsoft.com/office/drawing/2010/main" xmlns="" w="9525">
+              <a14:hiddenLine xmlns="" xmlns:a14="http://schemas.microsoft.com/office/drawing/2010/main" w="9525">
                 <a:solidFill>
                   <a:srgbClr val="000000"/>
                 </a:solidFill>
@@ -1993,7 +1993,7 @@
           <a:ln/>
           <a:extLst>
             <a:ext uri="{91240B29-F687-4f45-9708-019B960494DF}">
-              <a14:hiddenLine xmlns:a14="http://schemas.microsoft.com/office/drawing/2010/main" xmlns="" w="9525">
+              <a14:hiddenLine xmlns="" xmlns:a14="http://schemas.microsoft.com/office/drawing/2010/main" w="9525">
                 <a:solidFill>
                   <a:srgbClr val="000000"/>
                 </a:solidFill>
@@ -2273,7 +2273,7 @@
           <a:ln/>
           <a:extLst>
             <a:ext uri="{91240B29-F687-4f45-9708-019B960494DF}">
-              <a14:hiddenLine xmlns:a14="http://schemas.microsoft.com/office/drawing/2010/main" xmlns="" w="9525">
+              <a14:hiddenLine xmlns="" xmlns:a14="http://schemas.microsoft.com/office/drawing/2010/main" w="9525">
                 <a:solidFill>
                   <a:srgbClr val="000000"/>
                 </a:solidFill>
@@ -2893,7 +2893,7 @@
           <a:ln/>
           <a:extLst>
             <a:ext uri="{91240B29-F687-4f45-9708-019B960494DF}">
-              <a14:hiddenLine xmlns:a14="http://schemas.microsoft.com/office/drawing/2010/main" xmlns="" w="9525">
+              <a14:hiddenLine xmlns="" xmlns:a14="http://schemas.microsoft.com/office/drawing/2010/main" w="9525">
                 <a:solidFill>
                   <a:srgbClr val="000000"/>
                 </a:solidFill>
@@ -3229,7 +3229,7 @@
           <a:ln/>
           <a:extLst>
             <a:ext uri="{91240B29-F687-4f45-9708-019B960494DF}">
-              <a14:hiddenLine xmlns:a14="http://schemas.microsoft.com/office/drawing/2010/main" xmlns="" w="9525">
+              <a14:hiddenLine xmlns="" xmlns:a14="http://schemas.microsoft.com/office/drawing/2010/main" w="9525">
                 <a:solidFill>
                   <a:srgbClr val="000000"/>
                 </a:solidFill>
@@ -3703,7 +3703,7 @@
           <a:ln/>
           <a:extLst>
             <a:ext uri="{91240B29-F687-4f45-9708-019B960494DF}">
-              <a14:hiddenLine xmlns:a14="http://schemas.microsoft.com/office/drawing/2010/main" xmlns="" w="9525">
+              <a14:hiddenLine xmlns="" xmlns:a14="http://schemas.microsoft.com/office/drawing/2010/main" w="9525">
                 <a:solidFill>
                   <a:srgbClr val="000000"/>
                 </a:solidFill>
@@ -4126,7 +4126,7 @@
           <a:ln/>
           <a:extLst>
             <a:ext uri="{91240B29-F687-4f45-9708-019B960494DF}">
-              <a14:hiddenLine xmlns:a14="http://schemas.microsoft.com/office/drawing/2010/main" xmlns="" w="9525">
+              <a14:hiddenLine xmlns="" xmlns:a14="http://schemas.microsoft.com/office/drawing/2010/main" w="9525">
                 <a:solidFill>
                   <a:srgbClr val="000000"/>
                 </a:solidFill>
@@ -5528,7 +5528,6 @@
               <a:rPr lang="en-US" sz="2200" dirty="0" smtClean="0"/>
               <a:t>Develop control strategy to examine signal strength at various frequencies for a GPS location and determine the best antenna configuration to maximize RSS. </a:t>
             </a:r>
-            <a:endParaRPr lang="en-US" sz="2200" dirty="0" smtClean="0"/>
           </a:p>
         </p:txBody>
       </p:sp>
@@ -5648,7 +5647,6 @@
               <a:rPr lang="en-US" sz="2200" dirty="0" smtClean="0"/>
               <a:t>Began development of path planning algorithm with test data sets. </a:t>
             </a:r>
-            <a:endParaRPr lang="en-US" sz="2200" dirty="0" smtClean="0"/>
           </a:p>
         </p:txBody>
       </p:sp>
@@ -5702,14 +5700,12 @@
               <a:rPr lang="en-US" sz="2200" dirty="0" smtClean="0"/>
               <a:t>Update the path-planning algorithm to use real data and to determine optimal paths in real-time.</a:t>
             </a:r>
-            <a:endParaRPr lang="en-US" sz="2200" dirty="0" smtClean="0"/>
           </a:p>
           <a:p>
             <a:r>
               <a:rPr lang="en-US" sz="2200" dirty="0" smtClean="0"/>
               <a:t>Development of control strategy to make decisions about the best antenna system for a location. </a:t>
             </a:r>
-            <a:endParaRPr lang="en-US" sz="2200" dirty="0" smtClean="0"/>
           </a:p>
         </p:txBody>
       </p:sp>
@@ -5766,10 +5762,10 @@
           <a:lstStyle/>
           <a:p>
             <a:r>
-              <a:rPr lang="en-US" dirty="0" smtClean="0"/>
+              <a:rPr lang="en-US" sz="2400" dirty="0" smtClean="0"/>
               <a:t>Data Collection Setup on the Autonomous Rover</a:t>
             </a:r>
-            <a:endParaRPr lang="en-US" dirty="0"/>
+            <a:endParaRPr lang="en-US" sz="2400" dirty="0"/>
           </a:p>
         </p:txBody>
       </p:sp>
@@ -5813,51 +5809,18 @@
         </p:nvSpPr>
         <p:spPr/>
         <p:txBody>
-          <a:bodyPr/>
-          <a:lstStyle/>
-          <a:p>
-            <a:r>
-              <a:rPr lang="en-US" dirty="0" smtClean="0"/>
+          <a:bodyPr>
+            <a:normAutofit/>
+          </a:bodyPr>
+          <a:lstStyle/>
+          <a:p>
+            <a:r>
+              <a:rPr lang="en-US" sz="2000" dirty="0" smtClean="0"/>
               <a:t>There are three autonomous rovers being used for this project. The picture is of the smallest rover. </a:t>
             </a:r>
           </a:p>
           <a:p>
-            <a:endParaRPr lang="en-US" dirty="0" smtClean="0"/>
-          </a:p>
-          <a:p>
-            <a:r>
-              <a:rPr lang="en-US" dirty="0" smtClean="0"/>
-              <a:t>Hardware: </a:t>
-            </a:r>
-          </a:p>
-          <a:p>
-            <a:r>
-              <a:rPr lang="en-US" dirty="0" smtClean="0"/>
-              <a:t>Inside the case, there is a </a:t>
-            </a:r>
-            <a:r>
-              <a:rPr lang="en-US" dirty="0" err="1" smtClean="0"/>
-              <a:t>pixhawk</a:t>
-            </a:r>
-            <a:r>
-              <a:rPr lang="en-US" dirty="0" smtClean="0"/>
-              <a:t> used for the autonomous functionality of the rover. </a:t>
-            </a:r>
-          </a:p>
-          <a:p>
-            <a:r>
-              <a:rPr lang="en-US" dirty="0" smtClean="0"/>
-              <a:t>The board mounted on top is a Teensy which communicates RSS information back to a laptop using an </a:t>
-            </a:r>
-            <a:r>
-              <a:rPr lang="en-US" dirty="0" err="1" smtClean="0"/>
-              <a:t>Xbee</a:t>
-            </a:r>
-            <a:r>
-              <a:rPr lang="en-US" dirty="0" smtClean="0"/>
-              <a:t>. </a:t>
-            </a:r>
-            <a:endParaRPr lang="en-US" dirty="0"/>
+            <a:endParaRPr lang="en-US" sz="1600" dirty="0" smtClean="0"/>
           </a:p>
         </p:txBody>
       </p:sp>

</xml_diff>